<commit_message>
Update links in presentation.
</commit_message>
<xml_diff>
--- a/presentation/polish/Automatycznie testowalne aplikacje w srodowisku rozproszonym.pptx
+++ b/presentation/polish/Automatycznie testowalne aplikacje w srodowisku rozproszonym.pptx
@@ -5877,17 +5877,18 @@
               <a:buNone/>
             </a:pPr>
             <a:r>
+              <a:rPr lang="pl-PL" dirty="0" smtClean="0"/>
+              <a:t>github: https</a:t>
+            </a:r>
+            <a:r>
               <a:rPr lang="pl-PL" dirty="0"/>
-              <a:t>g</a:t>
-            </a:r>
-            <a:r>
-              <a:rPr lang="pl-PL" smtClean="0"/>
-              <a:t>ithub</a:t>
-            </a:r>
-            <a:r>
-              <a:rPr lang="pl-PL" dirty="0" smtClean="0"/>
-              <a:t>: https://github.com/plitwinski</a:t>
-            </a:r>
+              <a:t>://</a:t>
+            </a:r>
+            <a:r>
+              <a:rPr lang="pl-PL" dirty="0" smtClean="0"/>
+              <a:t>github.com/plitwinski/automated-tests-presentation</a:t>
+            </a:r>
+            <a:endParaRPr lang="pl-PL" dirty="0" smtClean="0"/>
           </a:p>
           <a:p>
             <a:pPr marL="0" indent="0">

</xml_diff>

<commit_message>
Editing and adding pdf version of the presentation in polish
</commit_message>
<xml_diff>
--- a/presentation/polish/Automatycznie testowalne aplikacje w srodowisku rozproszonym.pptx
+++ b/presentation/polish/Automatycznie testowalne aplikacje w srodowisku rozproszonym.pptx
@@ -5,7 +5,7 @@
     <p:sldMasterId id="2147483648" r:id="rId1"/>
   </p:sldMasterIdLst>
   <p:notesMasterIdLst>
-    <p:notesMasterId r:id="rId25"/>
+    <p:notesMasterId r:id="rId26"/>
   </p:notesMasterIdLst>
   <p:sldIdLst>
     <p:sldId id="256" r:id="rId2"/>
@@ -17,20 +17,21 @@
     <p:sldId id="281" r:id="rId8"/>
     <p:sldId id="259" r:id="rId9"/>
     <p:sldId id="260" r:id="rId10"/>
-    <p:sldId id="261" r:id="rId11"/>
-    <p:sldId id="282" r:id="rId12"/>
-    <p:sldId id="262" r:id="rId13"/>
-    <p:sldId id="267" r:id="rId14"/>
-    <p:sldId id="268" r:id="rId15"/>
-    <p:sldId id="269" r:id="rId16"/>
-    <p:sldId id="270" r:id="rId17"/>
-    <p:sldId id="271" r:id="rId18"/>
-    <p:sldId id="272" r:id="rId19"/>
-    <p:sldId id="273" r:id="rId20"/>
-    <p:sldId id="274" r:id="rId21"/>
-    <p:sldId id="275" r:id="rId22"/>
-    <p:sldId id="276" r:id="rId23"/>
-    <p:sldId id="277" r:id="rId24"/>
+    <p:sldId id="283" r:id="rId11"/>
+    <p:sldId id="261" r:id="rId12"/>
+    <p:sldId id="282" r:id="rId13"/>
+    <p:sldId id="262" r:id="rId14"/>
+    <p:sldId id="267" r:id="rId15"/>
+    <p:sldId id="268" r:id="rId16"/>
+    <p:sldId id="269" r:id="rId17"/>
+    <p:sldId id="270" r:id="rId18"/>
+    <p:sldId id="271" r:id="rId19"/>
+    <p:sldId id="272" r:id="rId20"/>
+    <p:sldId id="273" r:id="rId21"/>
+    <p:sldId id="274" r:id="rId22"/>
+    <p:sldId id="275" r:id="rId23"/>
+    <p:sldId id="276" r:id="rId24"/>
+    <p:sldId id="277" r:id="rId25"/>
   </p:sldIdLst>
   <p:sldSz cx="12192000" cy="6858000"/>
   <p:notesSz cx="6858000" cy="9144000"/>
@@ -231,7 +232,7 @@
           <a:p>
             <a:fld id="{6D50C51E-EFFB-4915-A982-E3AC0495EF2E}" type="datetimeFigureOut">
               <a:rPr lang="en-GB" smtClean="0"/>
-              <a:t>07/01/2018</a:t>
+              <a:t>09/01/2018</a:t>
             </a:fld>
             <a:endParaRPr lang="en-GB"/>
           </a:p>
@@ -641,7 +642,31 @@
             </a:r>
             <a:r>
               <a:rPr lang="pl-PL" baseline="0" dirty="0" smtClean="0"/>
-              <a:t> = wspomaganie rozwoju (TDD), regresja, testowanie glownego flow/hapy path, testowanie wszystkich przypadkow, wybranych, etc, red-green refactoring, etc.</a:t>
+              <a:t> = wspomaganie rozwoju (TDD), regresja, testowanie glownego </a:t>
+            </a:r>
+            <a:r>
+              <a:rPr lang="pl-PL" baseline="0" dirty="0" smtClean="0"/>
+              <a:t>flow/happy </a:t>
+            </a:r>
+            <a:r>
+              <a:rPr lang="pl-PL" baseline="0" dirty="0" smtClean="0"/>
+              <a:t>path, testowanie wszystkich przypadkow, wybranych</a:t>
+            </a:r>
+            <a:r>
+              <a:rPr lang="pl-PL" baseline="0" dirty="0" smtClean="0"/>
+              <a:t>, </a:t>
+            </a:r>
+            <a:r>
+              <a:rPr lang="pl-PL" baseline="0" dirty="0" smtClean="0"/>
+              <a:t>red-green </a:t>
+            </a:r>
+            <a:r>
+              <a:rPr lang="pl-PL" baseline="0" dirty="0" smtClean="0"/>
+              <a:t>refactor, </a:t>
+            </a:r>
+            <a:r>
+              <a:rPr lang="pl-PL" baseline="0" dirty="0" smtClean="0"/>
+              <a:t>etc.</a:t>
             </a:r>
           </a:p>
           <a:p>
@@ -676,7 +701,7 @@
           <a:p>
             <a:fld id="{1FE3D8C1-E517-46B6-9C32-FED0C0B6C2DD}" type="slidenum">
               <a:rPr lang="en-GB" smtClean="0"/>
-              <a:t>14</a:t>
+              <a:t>15</a:t>
             </a:fld>
             <a:endParaRPr lang="en-GB"/>
           </a:p>
@@ -768,7 +793,7 @@
           <a:p>
             <a:fld id="{1FE3D8C1-E517-46B6-9C32-FED0C0B6C2DD}" type="slidenum">
               <a:rPr lang="en-GB" smtClean="0"/>
-              <a:t>19</a:t>
+              <a:t>20</a:t>
             </a:fld>
             <a:endParaRPr lang="en-GB"/>
           </a:p>
@@ -880,7 +905,7 @@
           <a:p>
             <a:fld id="{1FE3D8C1-E517-46B6-9C32-FED0C0B6C2DD}" type="slidenum">
               <a:rPr lang="en-GB" smtClean="0"/>
-              <a:t>21</a:t>
+              <a:t>22</a:t>
             </a:fld>
             <a:endParaRPr lang="en-GB"/>
           </a:p>
@@ -1622,7 +1647,7 @@
           <a:p>
             <a:fld id="{1FE3D8C1-E517-46B6-9C32-FED0C0B6C2DD}" type="slidenum">
               <a:rPr lang="en-GB" smtClean="0"/>
-              <a:t>12</a:t>
+              <a:t>13</a:t>
             </a:fld>
             <a:endParaRPr lang="en-GB"/>
           </a:p>
@@ -1706,7 +1731,7 @@
           <a:p>
             <a:fld id="{1FE3D8C1-E517-46B6-9C32-FED0C0B6C2DD}" type="slidenum">
               <a:rPr lang="en-GB" smtClean="0"/>
-              <a:t>13</a:t>
+              <a:t>14</a:t>
             </a:fld>
             <a:endParaRPr lang="en-GB"/>
           </a:p>
@@ -1856,7 +1881,7 @@
           <a:p>
             <a:fld id="{84306E19-38DB-4254-BBD9-6C4CBC784CC1}" type="datetimeFigureOut">
               <a:rPr lang="en-GB" smtClean="0"/>
-              <a:t>07/01/2018</a:t>
+              <a:t>09/01/2018</a:t>
             </a:fld>
             <a:endParaRPr lang="en-GB"/>
           </a:p>
@@ -2026,7 +2051,7 @@
           <a:p>
             <a:fld id="{84306E19-38DB-4254-BBD9-6C4CBC784CC1}" type="datetimeFigureOut">
               <a:rPr lang="en-GB" smtClean="0"/>
-              <a:t>07/01/2018</a:t>
+              <a:t>09/01/2018</a:t>
             </a:fld>
             <a:endParaRPr lang="en-GB"/>
           </a:p>
@@ -2206,7 +2231,7 @@
           <a:p>
             <a:fld id="{84306E19-38DB-4254-BBD9-6C4CBC784CC1}" type="datetimeFigureOut">
               <a:rPr lang="en-GB" smtClean="0"/>
-              <a:t>07/01/2018</a:t>
+              <a:t>09/01/2018</a:t>
             </a:fld>
             <a:endParaRPr lang="en-GB"/>
           </a:p>
@@ -2376,7 +2401,7 @@
           <a:p>
             <a:fld id="{84306E19-38DB-4254-BBD9-6C4CBC784CC1}" type="datetimeFigureOut">
               <a:rPr lang="en-GB" smtClean="0"/>
-              <a:t>07/01/2018</a:t>
+              <a:t>09/01/2018</a:t>
             </a:fld>
             <a:endParaRPr lang="en-GB"/>
           </a:p>
@@ -2622,7 +2647,7 @@
           <a:p>
             <a:fld id="{84306E19-38DB-4254-BBD9-6C4CBC784CC1}" type="datetimeFigureOut">
               <a:rPr lang="en-GB" smtClean="0"/>
-              <a:t>07/01/2018</a:t>
+              <a:t>09/01/2018</a:t>
             </a:fld>
             <a:endParaRPr lang="en-GB"/>
           </a:p>
@@ -2854,7 +2879,7 @@
           <a:p>
             <a:fld id="{84306E19-38DB-4254-BBD9-6C4CBC784CC1}" type="datetimeFigureOut">
               <a:rPr lang="en-GB" smtClean="0"/>
-              <a:t>07/01/2018</a:t>
+              <a:t>09/01/2018</a:t>
             </a:fld>
             <a:endParaRPr lang="en-GB"/>
           </a:p>
@@ -3221,7 +3246,7 @@
           <a:p>
             <a:fld id="{84306E19-38DB-4254-BBD9-6C4CBC784CC1}" type="datetimeFigureOut">
               <a:rPr lang="en-GB" smtClean="0"/>
-              <a:t>07/01/2018</a:t>
+              <a:t>09/01/2018</a:t>
             </a:fld>
             <a:endParaRPr lang="en-GB"/>
           </a:p>
@@ -3339,7 +3364,7 @@
           <a:p>
             <a:fld id="{84306E19-38DB-4254-BBD9-6C4CBC784CC1}" type="datetimeFigureOut">
               <a:rPr lang="en-GB" smtClean="0"/>
-              <a:t>07/01/2018</a:t>
+              <a:t>09/01/2018</a:t>
             </a:fld>
             <a:endParaRPr lang="en-GB"/>
           </a:p>
@@ -3434,7 +3459,7 @@
           <a:p>
             <a:fld id="{84306E19-38DB-4254-BBD9-6C4CBC784CC1}" type="datetimeFigureOut">
               <a:rPr lang="en-GB" smtClean="0"/>
-              <a:t>07/01/2018</a:t>
+              <a:t>09/01/2018</a:t>
             </a:fld>
             <a:endParaRPr lang="en-GB"/>
           </a:p>
@@ -3711,7 +3736,7 @@
           <a:p>
             <a:fld id="{84306E19-38DB-4254-BBD9-6C4CBC784CC1}" type="datetimeFigureOut">
               <a:rPr lang="en-GB" smtClean="0"/>
-              <a:t>07/01/2018</a:t>
+              <a:t>09/01/2018</a:t>
             </a:fld>
             <a:endParaRPr lang="en-GB"/>
           </a:p>
@@ -3964,7 +3989,7 @@
           <a:p>
             <a:fld id="{84306E19-38DB-4254-BBD9-6C4CBC784CC1}" type="datetimeFigureOut">
               <a:rPr lang="en-GB" smtClean="0"/>
-              <a:t>07/01/2018</a:t>
+              <a:t>09/01/2018</a:t>
             </a:fld>
             <a:endParaRPr lang="en-GB"/>
           </a:p>
@@ -4177,7 +4202,7 @@
           <a:p>
             <a:fld id="{84306E19-38DB-4254-BBD9-6C4CBC784CC1}" type="datetimeFigureOut">
               <a:rPr lang="en-GB" smtClean="0"/>
-              <a:t>07/01/2018</a:t>
+              <a:t>09/01/2018</a:t>
             </a:fld>
             <a:endParaRPr lang="en-GB"/>
           </a:p>
@@ -4717,6 +4742,100 @@
           <a:lstStyle/>
           <a:p>
             <a:r>
+              <a:rPr lang="pl-PL" dirty="0"/>
+              <a:t>Narzędzia dla </a:t>
+            </a:r>
+            <a:r>
+              <a:rPr lang="pl-PL" dirty="0" smtClean="0"/>
+              <a:t>developera/opsa</a:t>
+            </a:r>
+            <a:endParaRPr lang="pl-PL" dirty="0"/>
+          </a:p>
+        </p:txBody>
+      </p:sp>
+      <p:sp>
+        <p:nvSpPr>
+          <p:cNvPr id="3" name="Content Placeholder 2"/>
+          <p:cNvSpPr>
+            <a:spLocks noGrp="1"/>
+          </p:cNvSpPr>
+          <p:nvPr>
+            <p:ph idx="1"/>
+          </p:nvPr>
+        </p:nvSpPr>
+        <p:spPr/>
+        <p:txBody>
+          <a:bodyPr/>
+          <a:lstStyle/>
+          <a:p>
+            <a:r>
+              <a:rPr lang="pl-PL" dirty="0" smtClean="0"/>
+              <a:t>Narzędzia do wykorzystania podczas uruchomienia w danym środowisku</a:t>
+            </a:r>
+          </a:p>
+          <a:p>
+            <a:pPr lvl="1"/>
+            <a:r>
+              <a:rPr lang="pl-PL" dirty="0" smtClean="0"/>
+              <a:t>Agent CD uruchamia kod z testami, które sprawdzają integrację z zewnętrznymi serwisami (np.: sprawdzenie endpoint’u, etc)</a:t>
+            </a:r>
+          </a:p>
+          <a:p>
+            <a:pPr lvl="1"/>
+            <a:r>
+              <a:rPr lang="pl-PL" dirty="0" smtClean="0"/>
+              <a:t>Uruchomienie diagnostyki zależności przy starcie serwisu</a:t>
+            </a:r>
+            <a:endParaRPr lang="pl-PL" dirty="0"/>
+          </a:p>
+        </p:txBody>
+      </p:sp>
+    </p:spTree>
+    <p:extLst>
+      <p:ext uri="{BB962C8B-B14F-4D97-AF65-F5344CB8AC3E}">
+        <p14:creationId xmlns:p14="http://schemas.microsoft.com/office/powerpoint/2010/main" val="442111246"/>
+      </p:ext>
+    </p:extLst>
+  </p:cSld>
+  <p:clrMapOvr>
+    <a:masterClrMapping/>
+  </p:clrMapOvr>
+</p:sld>
+</file>
+
+<file path=ppt/slides/slide11.xml><?xml version="1.0" encoding="utf-8"?>
+<p:sld xmlns:a="http://schemas.openxmlformats.org/drawingml/2006/main" xmlns:r="http://schemas.openxmlformats.org/officeDocument/2006/relationships" xmlns:p="http://schemas.openxmlformats.org/presentationml/2006/main">
+  <p:cSld>
+    <p:spTree>
+      <p:nvGrpSpPr>
+        <p:cNvPr id="1" name=""/>
+        <p:cNvGrpSpPr/>
+        <p:nvPr/>
+      </p:nvGrpSpPr>
+      <p:grpSpPr>
+        <a:xfrm>
+          <a:off x="0" y="0"/>
+          <a:ext cx="0" cy="0"/>
+          <a:chOff x="0" y="0"/>
+          <a:chExt cx="0" cy="0"/>
+        </a:xfrm>
+      </p:grpSpPr>
+      <p:sp>
+        <p:nvSpPr>
+          <p:cNvPr id="2" name="Title 1"/>
+          <p:cNvSpPr>
+            <a:spLocks noGrp="1"/>
+          </p:cNvSpPr>
+          <p:nvPr>
+            <p:ph type="title"/>
+          </p:nvPr>
+        </p:nvSpPr>
+        <p:spPr/>
+        <p:txBody>
+          <a:bodyPr/>
+          <a:lstStyle/>
+          <a:p>
+            <a:r>
               <a:rPr lang="pl-PL" dirty="0" smtClean="0"/>
               <a:t>Narzędzia dla developera – przykłady 1,2</a:t>
             </a:r>
@@ -4841,7 +4960,7 @@
 </p:sld>
 </file>
 
-<file path=ppt/slides/slide11.xml><?xml version="1.0" encoding="utf-8"?>
+<file path=ppt/slides/slide12.xml><?xml version="1.0" encoding="utf-8"?>
 <p:sld xmlns:a="http://schemas.openxmlformats.org/drawingml/2006/main" xmlns:r="http://schemas.openxmlformats.org/officeDocument/2006/relationships" xmlns:p="http://schemas.openxmlformats.org/presentationml/2006/main">
   <p:cSld>
     <p:spTree>
@@ -4997,7 +5116,7 @@
 </p:sld>
 </file>
 
-<file path=ppt/slides/slide12.xml><?xml version="1.0" encoding="utf-8"?>
+<file path=ppt/slides/slide13.xml><?xml version="1.0" encoding="utf-8"?>
 <p:sld xmlns:a="http://schemas.openxmlformats.org/drawingml/2006/main" xmlns:r="http://schemas.openxmlformats.org/officeDocument/2006/relationships" xmlns:p="http://schemas.openxmlformats.org/presentationml/2006/main">
   <p:cSld>
     <p:spTree>
@@ -5097,7 +5216,7 @@
 </p:sld>
 </file>
 
-<file path=ppt/slides/slide13.xml><?xml version="1.0" encoding="utf-8"?>
+<file path=ppt/slides/slide14.xml><?xml version="1.0" encoding="utf-8"?>
 <p:sld xmlns:a="http://schemas.openxmlformats.org/drawingml/2006/main" xmlns:r="http://schemas.openxmlformats.org/officeDocument/2006/relationships" xmlns:p="http://schemas.openxmlformats.org/presentationml/2006/main">
   <p:cSld>
     <p:spTree>
@@ -5186,7 +5305,7 @@
 </p:sld>
 </file>
 
-<file path=ppt/slides/slide14.xml><?xml version="1.0" encoding="utf-8"?>
+<file path=ppt/slides/slide15.xml><?xml version="1.0" encoding="utf-8"?>
 <p:sld xmlns:a="http://schemas.openxmlformats.org/drawingml/2006/main" xmlns:r="http://schemas.openxmlformats.org/officeDocument/2006/relationships" xmlns:p="http://schemas.openxmlformats.org/presentationml/2006/main">
   <p:cSld>
     <p:spTree>
@@ -5264,7 +5383,7 @@
 </p:sld>
 </file>
 
-<file path=ppt/slides/slide15.xml><?xml version="1.0" encoding="utf-8"?>
+<file path=ppt/slides/slide16.xml><?xml version="1.0" encoding="utf-8"?>
 <p:sld xmlns:a="http://schemas.openxmlformats.org/drawingml/2006/main" xmlns:r="http://schemas.openxmlformats.org/officeDocument/2006/relationships" xmlns:p="http://schemas.openxmlformats.org/presentationml/2006/main">
   <p:cSld>
     <p:spTree>
@@ -5348,7 +5467,7 @@
 </p:sld>
 </file>
 
-<file path=ppt/slides/slide16.xml><?xml version="1.0" encoding="utf-8"?>
+<file path=ppt/slides/slide17.xml><?xml version="1.0" encoding="utf-8"?>
 <p:sld xmlns:a="http://schemas.openxmlformats.org/drawingml/2006/main" xmlns:r="http://schemas.openxmlformats.org/officeDocument/2006/relationships" xmlns:p="http://schemas.openxmlformats.org/presentationml/2006/main">
   <p:cSld>
     <p:spTree>
@@ -5432,7 +5551,7 @@
 </p:sld>
 </file>
 
-<file path=ppt/slides/slide17.xml><?xml version="1.0" encoding="utf-8"?>
+<file path=ppt/slides/slide18.xml><?xml version="1.0" encoding="utf-8"?>
 <p:sld xmlns:a="http://schemas.openxmlformats.org/drawingml/2006/main" xmlns:r="http://schemas.openxmlformats.org/officeDocument/2006/relationships" xmlns:p="http://schemas.openxmlformats.org/presentationml/2006/main">
   <p:cSld>
     <p:spTree>
@@ -5516,7 +5635,7 @@
 </p:sld>
 </file>
 
-<file path=ppt/slides/slide18.xml><?xml version="1.0" encoding="utf-8"?>
+<file path=ppt/slides/slide19.xml><?xml version="1.0" encoding="utf-8"?>
 <p:sld xmlns:a="http://schemas.openxmlformats.org/drawingml/2006/main" xmlns:r="http://schemas.openxmlformats.org/officeDocument/2006/relationships" xmlns:p="http://schemas.openxmlformats.org/presentationml/2006/main">
   <p:cSld>
     <p:spTree>
@@ -5562,8 +5681,13 @@
           <a:p>
             <a:r>
               <a:rPr lang="pl-PL" dirty="0" smtClean="0"/>
-              <a:t>Ilość wprowadzeń nowych wersji na produkcję vs wycofanych wersji</a:t>
-            </a:r>
+              <a:t>Ilość wprowadzeń nowych wersji na produkcję vs wycofanych </a:t>
+            </a:r>
+            <a:r>
+              <a:rPr lang="pl-PL" dirty="0" smtClean="0"/>
+              <a:t>wersji spowodowanych błędami implementacji</a:t>
+            </a:r>
+            <a:endParaRPr lang="pl-PL" dirty="0" smtClean="0"/>
           </a:p>
           <a:p>
             <a:r>
@@ -5574,13 +5698,8 @@
           <a:p>
             <a:r>
               <a:rPr lang="pl-PL" dirty="0" smtClean="0"/>
-              <a:t>Mutation tests (testy </a:t>
-            </a:r>
-            <a:r>
-              <a:rPr lang="pl-PL" smtClean="0"/>
-              <a:t>mutacyjne)</a:t>
-            </a:r>
-            <a:endParaRPr lang="pl-PL" dirty="0" smtClean="0"/>
+              <a:t>Mutation tests (testy mutacyjne)</a:t>
+            </a:r>
           </a:p>
         </p:txBody>
       </p:sp>
@@ -5604,7 +5723,123 @@
 </p:sld>
 </file>
 
-<file path=ppt/slides/slide19.xml><?xml version="1.0" encoding="utf-8"?>
+<file path=ppt/slides/slide2.xml><?xml version="1.0" encoding="utf-8"?>
+<p:sld xmlns:a="http://schemas.openxmlformats.org/drawingml/2006/main" xmlns:r="http://schemas.openxmlformats.org/officeDocument/2006/relationships" xmlns:p="http://schemas.openxmlformats.org/presentationml/2006/main">
+  <p:cSld>
+    <p:spTree>
+      <p:nvGrpSpPr>
+        <p:cNvPr id="1" name=""/>
+        <p:cNvGrpSpPr/>
+        <p:nvPr/>
+      </p:nvGrpSpPr>
+      <p:grpSpPr>
+        <a:xfrm>
+          <a:off x="0" y="0"/>
+          <a:ext cx="0" cy="0"/>
+          <a:chOff x="0" y="0"/>
+          <a:chExt cx="0" cy="0"/>
+        </a:xfrm>
+      </p:grpSpPr>
+      <p:sp>
+        <p:nvSpPr>
+          <p:cNvPr id="2" name="Title 1"/>
+          <p:cNvSpPr>
+            <a:spLocks noGrp="1"/>
+          </p:cNvSpPr>
+          <p:nvPr>
+            <p:ph type="title"/>
+          </p:nvPr>
+        </p:nvSpPr>
+        <p:spPr/>
+        <p:txBody>
+          <a:bodyPr/>
+          <a:lstStyle/>
+          <a:p>
+            <a:r>
+              <a:rPr lang="pl-PL" dirty="0" smtClean="0"/>
+              <a:t>Agenda</a:t>
+            </a:r>
+            <a:endParaRPr lang="en-GB" dirty="0"/>
+          </a:p>
+        </p:txBody>
+      </p:sp>
+      <p:sp>
+        <p:nvSpPr>
+          <p:cNvPr id="3" name="Content Placeholder 2"/>
+          <p:cNvSpPr>
+            <a:spLocks noGrp="1"/>
+          </p:cNvSpPr>
+          <p:nvPr>
+            <p:ph idx="1"/>
+          </p:nvPr>
+        </p:nvSpPr>
+        <p:spPr/>
+        <p:txBody>
+          <a:bodyPr/>
+          <a:lstStyle/>
+          <a:p>
+            <a:r>
+              <a:rPr lang="pl-PL" dirty="0" smtClean="0"/>
+              <a:t>W czym tkwi problem?</a:t>
+            </a:r>
+          </a:p>
+          <a:p>
+            <a:r>
+              <a:rPr lang="pl-PL" dirty="0"/>
+              <a:t>Rodzaje </a:t>
+            </a:r>
+            <a:r>
+              <a:rPr lang="pl-PL" dirty="0" smtClean="0"/>
+              <a:t>testów</a:t>
+            </a:r>
+          </a:p>
+          <a:p>
+            <a:r>
+              <a:rPr lang="pl-PL" dirty="0" smtClean="0"/>
+              <a:t>Jakich narzędzi użyć?</a:t>
+            </a:r>
+          </a:p>
+          <a:p>
+            <a:r>
+              <a:rPr lang="pl-PL" dirty="0" smtClean="0"/>
+              <a:t>Jak pisać testy automatyczne?</a:t>
+            </a:r>
+          </a:p>
+          <a:p>
+            <a:r>
+              <a:rPr lang="pl-PL" dirty="0" smtClean="0"/>
+              <a:t>Jak testować testy?</a:t>
+            </a:r>
+          </a:p>
+          <a:p>
+            <a:r>
+              <a:rPr lang="pl-PL" dirty="0" smtClean="0"/>
+              <a:t>Podsumowanie - wady i zalety</a:t>
+            </a:r>
+          </a:p>
+        </p:txBody>
+      </p:sp>
+    </p:spTree>
+    <p:extLst>
+      <p:ext uri="{BB962C8B-B14F-4D97-AF65-F5344CB8AC3E}">
+        <p14:creationId xmlns:p14="http://schemas.microsoft.com/office/powerpoint/2010/main" val="4042561130"/>
+      </p:ext>
+    </p:extLst>
+  </p:cSld>
+  <p:clrMapOvr>
+    <a:masterClrMapping/>
+  </p:clrMapOvr>
+  <p:timing>
+    <p:tnLst>
+      <p:par>
+        <p:cTn id="1" dur="indefinite" restart="never" nodeType="tmRoot"/>
+      </p:par>
+    </p:tnLst>
+  </p:timing>
+</p:sld>
+</file>
+
+<file path=ppt/slides/slide20.xml><?xml version="1.0" encoding="utf-8"?>
 <p:sld xmlns:a="http://schemas.openxmlformats.org/drawingml/2006/main" xmlns:r="http://schemas.openxmlformats.org/officeDocument/2006/relationships" xmlns:p="http://schemas.openxmlformats.org/presentationml/2006/main">
   <p:cSld>
     <p:spTree>
@@ -5694,123 +5929,7 @@
 </p:sld>
 </file>
 
-<file path=ppt/slides/slide2.xml><?xml version="1.0" encoding="utf-8"?>
-<p:sld xmlns:a="http://schemas.openxmlformats.org/drawingml/2006/main" xmlns:r="http://schemas.openxmlformats.org/officeDocument/2006/relationships" xmlns:p="http://schemas.openxmlformats.org/presentationml/2006/main">
-  <p:cSld>
-    <p:spTree>
-      <p:nvGrpSpPr>
-        <p:cNvPr id="1" name=""/>
-        <p:cNvGrpSpPr/>
-        <p:nvPr/>
-      </p:nvGrpSpPr>
-      <p:grpSpPr>
-        <a:xfrm>
-          <a:off x="0" y="0"/>
-          <a:ext cx="0" cy="0"/>
-          <a:chOff x="0" y="0"/>
-          <a:chExt cx="0" cy="0"/>
-        </a:xfrm>
-      </p:grpSpPr>
-      <p:sp>
-        <p:nvSpPr>
-          <p:cNvPr id="2" name="Title 1"/>
-          <p:cNvSpPr>
-            <a:spLocks noGrp="1"/>
-          </p:cNvSpPr>
-          <p:nvPr>
-            <p:ph type="title"/>
-          </p:nvPr>
-        </p:nvSpPr>
-        <p:spPr/>
-        <p:txBody>
-          <a:bodyPr/>
-          <a:lstStyle/>
-          <a:p>
-            <a:r>
-              <a:rPr lang="pl-PL" dirty="0" smtClean="0"/>
-              <a:t>Agenda</a:t>
-            </a:r>
-            <a:endParaRPr lang="en-GB" dirty="0"/>
-          </a:p>
-        </p:txBody>
-      </p:sp>
-      <p:sp>
-        <p:nvSpPr>
-          <p:cNvPr id="3" name="Content Placeholder 2"/>
-          <p:cNvSpPr>
-            <a:spLocks noGrp="1"/>
-          </p:cNvSpPr>
-          <p:nvPr>
-            <p:ph idx="1"/>
-          </p:nvPr>
-        </p:nvSpPr>
-        <p:spPr/>
-        <p:txBody>
-          <a:bodyPr/>
-          <a:lstStyle/>
-          <a:p>
-            <a:r>
-              <a:rPr lang="pl-PL" dirty="0" smtClean="0"/>
-              <a:t>W czym tkwi problem?</a:t>
-            </a:r>
-          </a:p>
-          <a:p>
-            <a:r>
-              <a:rPr lang="pl-PL" dirty="0"/>
-              <a:t>Rodzaje </a:t>
-            </a:r>
-            <a:r>
-              <a:rPr lang="pl-PL" dirty="0" smtClean="0"/>
-              <a:t>testów</a:t>
-            </a:r>
-          </a:p>
-          <a:p>
-            <a:r>
-              <a:rPr lang="pl-PL" dirty="0" smtClean="0"/>
-              <a:t>Jakich narzędzi użyć?</a:t>
-            </a:r>
-          </a:p>
-          <a:p>
-            <a:r>
-              <a:rPr lang="pl-PL" dirty="0" smtClean="0"/>
-              <a:t>Jak pisać testy automatyczne?</a:t>
-            </a:r>
-          </a:p>
-          <a:p>
-            <a:r>
-              <a:rPr lang="pl-PL" dirty="0" smtClean="0"/>
-              <a:t>Jak testować testy?</a:t>
-            </a:r>
-          </a:p>
-          <a:p>
-            <a:r>
-              <a:rPr lang="pl-PL" dirty="0" smtClean="0"/>
-              <a:t>Podsumowanie - wady i zalety</a:t>
-            </a:r>
-          </a:p>
-        </p:txBody>
-      </p:sp>
-    </p:spTree>
-    <p:extLst>
-      <p:ext uri="{BB962C8B-B14F-4D97-AF65-F5344CB8AC3E}">
-        <p14:creationId xmlns:p14="http://schemas.microsoft.com/office/powerpoint/2010/main" val="4042561130"/>
-      </p:ext>
-    </p:extLst>
-  </p:cSld>
-  <p:clrMapOvr>
-    <a:masterClrMapping/>
-  </p:clrMapOvr>
-  <p:timing>
-    <p:tnLst>
-      <p:par>
-        <p:cTn id="1" dur="indefinite" restart="never" nodeType="tmRoot"/>
-      </p:par>
-    </p:tnLst>
-  </p:timing>
-</p:sld>
-</file>
-
-<file path=ppt/slides/slide20.xml><?xml version="1.0" encoding="utf-8"?>
+<file path=ppt/slides/slide21.xml><?xml version="1.0" encoding="utf-8"?>
 <p:sld xmlns:a="http://schemas.openxmlformats.org/drawingml/2006/main" xmlns:r="http://schemas.openxmlformats.org/officeDocument/2006/relationships" xmlns:p="http://schemas.openxmlformats.org/presentationml/2006/main">
   <p:cSld>
     <p:spTree>
@@ -5904,7 +6023,7 @@
 </p:sld>
 </file>
 
-<file path=ppt/slides/slide21.xml><?xml version="1.0" encoding="utf-8"?>
+<file path=ppt/slides/slide22.xml><?xml version="1.0" encoding="utf-8"?>
 <p:sld xmlns:a="http://schemas.openxmlformats.org/drawingml/2006/main" xmlns:r="http://schemas.openxmlformats.org/officeDocument/2006/relationships" xmlns:p="http://schemas.openxmlformats.org/presentationml/2006/main">
   <p:cSld>
     <p:spTree>
@@ -6005,7 +6124,7 @@
 </p:sld>
 </file>
 
-<file path=ppt/slides/slide22.xml><?xml version="1.0" encoding="utf-8"?>
+<file path=ppt/slides/slide23.xml><?xml version="1.0" encoding="utf-8"?>
 <p:sld xmlns:a="http://schemas.openxmlformats.org/drawingml/2006/main" xmlns:r="http://schemas.openxmlformats.org/officeDocument/2006/relationships" xmlns:p="http://schemas.openxmlformats.org/presentationml/2006/main">
   <p:cSld>
     <p:spTree>
@@ -6095,7 +6214,7 @@
 </p:sld>
 </file>
 
-<file path=ppt/slides/slide23.xml><?xml version="1.0" encoding="utf-8"?>
+<file path=ppt/slides/slide24.xml><?xml version="1.0" encoding="utf-8"?>
 <p:sld xmlns:a="http://schemas.openxmlformats.org/drawingml/2006/main" xmlns:r="http://schemas.openxmlformats.org/officeDocument/2006/relationships" xmlns:p="http://schemas.openxmlformats.org/presentationml/2006/main">
   <p:cSld>
     <p:spTree>
@@ -6178,16 +6297,22 @@
               <a:buNone/>
             </a:pPr>
             <a:r>
+              <a:rPr lang="pl-PL" dirty="0" smtClean="0">
+                <a:hlinkClick r:id="rId3"/>
+              </a:rPr>
+              <a:t>https</a:t>
+            </a:r>
+            <a:r>
               <a:rPr lang="pl-PL" dirty="0">
                 <a:hlinkClick r:id="rId3"/>
               </a:rPr>
-              <a:t>https://</a:t>
+              <a:t>://</a:t>
             </a:r>
             <a:r>
               <a:rPr lang="pl-PL" dirty="0" smtClean="0">
                 <a:hlinkClick r:id="rId3"/>
               </a:rPr>
-              <a:t>en.wikipedia.org/wiki/Formal_verification</a:t>
+              <a:t>medium.com/netflix-techblog/the-netflix-simian-army-16e57fbab116</a:t>
             </a:r>
             <a:endParaRPr lang="pl-PL" dirty="0" smtClean="0"/>
           </a:p>
@@ -6196,16 +6321,22 @@
               <a:buNone/>
             </a:pPr>
             <a:r>
+              <a:rPr lang="pl-PL" dirty="0" smtClean="0">
+                <a:hlinkClick r:id="rId4"/>
+              </a:rPr>
+              <a:t>https</a:t>
+            </a:r>
+            <a:r>
               <a:rPr lang="pl-PL" dirty="0">
                 <a:hlinkClick r:id="rId4"/>
               </a:rPr>
-              <a:t>https://</a:t>
+              <a:t>://</a:t>
             </a:r>
             <a:r>
               <a:rPr lang="pl-PL" dirty="0" smtClean="0">
                 <a:hlinkClick r:id="rId4"/>
               </a:rPr>
-              <a:t>medium.com/netflix-techblog/the-netflix-simian-army-16e57fbab116</a:t>
+              <a:t>en.wikipedia.org/wiki/Mutation_testing</a:t>
             </a:r>
             <a:endParaRPr lang="pl-PL" dirty="0" smtClean="0"/>
           </a:p>
@@ -6222,42 +6353,6 @@
             <a:r>
               <a:rPr lang="pl-PL" dirty="0" smtClean="0">
                 <a:hlinkClick r:id="rId5"/>
-              </a:rPr>
-              <a:t>medium.com/netflix-techblog/chaos-engineering-upgraded-878d341f15fa</a:t>
-            </a:r>
-            <a:endParaRPr lang="pl-PL" dirty="0" smtClean="0"/>
-          </a:p>
-          <a:p>
-            <a:pPr marL="0" indent="0">
-              <a:buNone/>
-            </a:pPr>
-            <a:r>
-              <a:rPr lang="pl-PL" dirty="0">
-                <a:hlinkClick r:id="rId6"/>
-              </a:rPr>
-              <a:t>https://</a:t>
-            </a:r>
-            <a:r>
-              <a:rPr lang="pl-PL" dirty="0" smtClean="0">
-                <a:hlinkClick r:id="rId6"/>
-              </a:rPr>
-              <a:t>en.wikipedia.org/wiki/Mutation_testing</a:t>
-            </a:r>
-            <a:endParaRPr lang="pl-PL" dirty="0" smtClean="0"/>
-          </a:p>
-          <a:p>
-            <a:pPr marL="0" indent="0">
-              <a:buNone/>
-            </a:pPr>
-            <a:r>
-              <a:rPr lang="pl-PL" dirty="0">
-                <a:hlinkClick r:id="rId7"/>
-              </a:rPr>
-              <a:t>https://</a:t>
-            </a:r>
-            <a:r>
-              <a:rPr lang="pl-PL" dirty="0" smtClean="0">
-                <a:hlinkClick r:id="rId7"/>
               </a:rPr>
               <a:t>martinfowler.com/articles/microservice-testing</a:t>
             </a:r>

</xml_diff>